<commit_message>
add database demo relations
</commit_message>
<xml_diff>
--- a/XI class/01. OOP - Module 1/06. Класове и обекти/Classes and objects.pptx
+++ b/XI class/01. OOP - Module 1/06. Класове и обекти/Classes and objects.pptx
@@ -153,6 +153,10 @@
             <p14:sldId id="266"/>
             <p14:sldId id="267"/>
             <p14:sldId id="268"/>
+          </p14:sldIdLst>
+        </p14:section>
+        <p14:section name="First group" id="{9E784E2F-C5BA-4D2C-8C61-96B01DE62F16}">
+          <p14:sldIdLst>
             <p14:sldId id="269"/>
             <p14:sldId id="270"/>
           </p14:sldIdLst>
@@ -167,6 +171,10 @@
             <p14:sldId id="276"/>
             <p14:sldId id="277"/>
             <p14:sldId id="278"/>
+          </p14:sldIdLst>
+        </p14:section>
+        <p14:section name="XI - i group" id="{A2252F15-0984-4DA5-8174-7F00A48E68E5}">
+          <p14:sldIdLst>
             <p14:sldId id="279"/>
             <p14:sldId id="280"/>
             <p14:sldId id="281"/>
@@ -2013,7 +2021,7 @@
           <a:p>
             <a:fld id="{3DCDD116-73C5-4B5A-80E0-3C3E4F493EA3}" type="datetimeFigureOut">
               <a:rPr lang="en-GB" smtClean="0"/>
-              <a:t>16/11/2023</a:t>
+              <a:t>05/11/2024</a:t>
             </a:fld>
             <a:endParaRPr lang="en-GB"/>
           </a:p>
@@ -2213,7 +2221,7 @@
           <a:p>
             <a:fld id="{3DCDD116-73C5-4B5A-80E0-3C3E4F493EA3}" type="datetimeFigureOut">
               <a:rPr lang="en-GB" smtClean="0"/>
-              <a:t>16/11/2023</a:t>
+              <a:t>05/11/2024</a:t>
             </a:fld>
             <a:endParaRPr lang="en-GB"/>
           </a:p>
@@ -2423,7 +2431,7 @@
           <a:p>
             <a:fld id="{3DCDD116-73C5-4B5A-80E0-3C3E4F493EA3}" type="datetimeFigureOut">
               <a:rPr lang="en-GB" smtClean="0"/>
-              <a:t>16/11/2023</a:t>
+              <a:t>05/11/2024</a:t>
             </a:fld>
             <a:endParaRPr lang="en-GB"/>
           </a:p>
@@ -2623,7 +2631,7 @@
           <a:p>
             <a:fld id="{3DCDD116-73C5-4B5A-80E0-3C3E4F493EA3}" type="datetimeFigureOut">
               <a:rPr lang="en-GB" smtClean="0"/>
-              <a:t>16/11/2023</a:t>
+              <a:t>05/11/2024</a:t>
             </a:fld>
             <a:endParaRPr lang="en-GB"/>
           </a:p>
@@ -2899,7 +2907,7 @@
           <a:p>
             <a:fld id="{3DCDD116-73C5-4B5A-80E0-3C3E4F493EA3}" type="datetimeFigureOut">
               <a:rPr lang="en-GB" smtClean="0"/>
-              <a:t>16/11/2023</a:t>
+              <a:t>05/11/2024</a:t>
             </a:fld>
             <a:endParaRPr lang="en-GB"/>
           </a:p>
@@ -3167,7 +3175,7 @@
           <a:p>
             <a:fld id="{3DCDD116-73C5-4B5A-80E0-3C3E4F493EA3}" type="datetimeFigureOut">
               <a:rPr lang="en-GB" smtClean="0"/>
-              <a:t>16/11/2023</a:t>
+              <a:t>05/11/2024</a:t>
             </a:fld>
             <a:endParaRPr lang="en-GB"/>
           </a:p>
@@ -3582,7 +3590,7 @@
           <a:p>
             <a:fld id="{3DCDD116-73C5-4B5A-80E0-3C3E4F493EA3}" type="datetimeFigureOut">
               <a:rPr lang="en-GB" smtClean="0"/>
-              <a:t>16/11/2023</a:t>
+              <a:t>05/11/2024</a:t>
             </a:fld>
             <a:endParaRPr lang="en-GB"/>
           </a:p>
@@ -3724,7 +3732,7 @@
           <a:p>
             <a:fld id="{3DCDD116-73C5-4B5A-80E0-3C3E4F493EA3}" type="datetimeFigureOut">
               <a:rPr lang="en-GB" smtClean="0"/>
-              <a:t>16/11/2023</a:t>
+              <a:t>05/11/2024</a:t>
             </a:fld>
             <a:endParaRPr lang="en-GB"/>
           </a:p>
@@ -3837,7 +3845,7 @@
           <a:p>
             <a:fld id="{3DCDD116-73C5-4B5A-80E0-3C3E4F493EA3}" type="datetimeFigureOut">
               <a:rPr lang="en-GB" smtClean="0"/>
-              <a:t>16/11/2023</a:t>
+              <a:t>05/11/2024</a:t>
             </a:fld>
             <a:endParaRPr lang="en-GB"/>
           </a:p>
@@ -4150,7 +4158,7 @@
           <a:p>
             <a:fld id="{3DCDD116-73C5-4B5A-80E0-3C3E4F493EA3}" type="datetimeFigureOut">
               <a:rPr lang="en-GB" smtClean="0"/>
-              <a:t>16/11/2023</a:t>
+              <a:t>05/11/2024</a:t>
             </a:fld>
             <a:endParaRPr lang="en-GB"/>
           </a:p>
@@ -4439,7 +4447,7 @@
           <a:p>
             <a:fld id="{3DCDD116-73C5-4B5A-80E0-3C3E4F493EA3}" type="datetimeFigureOut">
               <a:rPr lang="en-GB" smtClean="0"/>
-              <a:t>16/11/2023</a:t>
+              <a:t>05/11/2024</a:t>
             </a:fld>
             <a:endParaRPr lang="en-GB"/>
           </a:p>
@@ -4682,7 +4690,7 @@
           <a:p>
             <a:fld id="{3DCDD116-73C5-4B5A-80E0-3C3E4F493EA3}" type="datetimeFigureOut">
               <a:rPr lang="en-GB" smtClean="0"/>
-              <a:t>16/11/2023</a:t>
+              <a:t>05/11/2024</a:t>
             </a:fld>
             <a:endParaRPr lang="en-GB"/>
           </a:p>

</xml_diff>